<commit_message>
Updated plan in presentation.
</commit_message>
<xml_diff>
--- a/Part 2/WiX Part 2.pptx
+++ b/Part 2/WiX Part 2.pptx
@@ -5,16 +5,15 @@
     <p:sldMasterId id="2147483660" r:id="rId2"/>
   </p:sldMasterIdLst>
   <p:notesMasterIdLst>
-    <p:notesMasterId r:id="rId7"/>
+    <p:notesMasterId r:id="rId6"/>
   </p:notesMasterIdLst>
   <p:handoutMasterIdLst>
-    <p:handoutMasterId r:id="rId8"/>
+    <p:handoutMasterId r:id="rId7"/>
   </p:handoutMasterIdLst>
   <p:sldIdLst>
     <p:sldId id="256" r:id="rId3"/>
     <p:sldId id="261" r:id="rId4"/>
     <p:sldId id="268" r:id="rId5"/>
-    <p:sldId id="267" r:id="rId6"/>
   </p:sldIdLst>
   <p:sldSz cx="12192000" cy="6858000"/>
   <p:notesSz cx="6858000" cy="9144000"/>
@@ -206,7 +205,7 @@
           <a:p>
             <a:fld id="{BE6FE14A-16AB-4C40-A7D8-3F677DBFF089}" type="datetimeFigureOut">
               <a:rPr lang="ru-RU" smtClean="0"/>
-              <a:t>03.01.2016</a:t>
+              <a:t>04.01.2016</a:t>
             </a:fld>
             <a:endParaRPr lang="ru-RU" dirty="0"/>
           </a:p>
@@ -371,7 +370,7 @@
           <a:p>
             <a:fld id="{C15A5BB7-EDD2-4B8D-93DB-AF0055258AEF}" type="datetimeFigureOut">
               <a:rPr lang="ru-RU" smtClean="0"/>
-              <a:t>03.01.2016</a:t>
+              <a:t>04.01.2016</a:t>
             </a:fld>
             <a:endParaRPr lang="ru-RU" dirty="0"/>
           </a:p>
@@ -1708,7 +1707,7 @@
           <a:p>
             <a:fld id="{FF11F0EC-4F60-4544-9956-271209A740FE}" type="datetimeFigureOut">
               <a:rPr lang="ru-RU" smtClean="0"/>
-              <a:t>03.01.2016</a:t>
+              <a:t>04.01.2016</a:t>
             </a:fld>
             <a:endParaRPr lang="ru-RU" dirty="0"/>
           </a:p>
@@ -1959,7 +1958,7 @@
           <a:p>
             <a:fld id="{FF11F0EC-4F60-4544-9956-271209A740FE}" type="datetimeFigureOut">
               <a:rPr lang="ru-RU" smtClean="0"/>
-              <a:t>03.01.2016</a:t>
+              <a:t>04.01.2016</a:t>
             </a:fld>
             <a:endParaRPr lang="ru-RU" dirty="0"/>
           </a:p>
@@ -2210,7 +2209,7 @@
           <a:p>
             <a:fld id="{FF11F0EC-4F60-4544-9956-271209A740FE}" type="datetimeFigureOut">
               <a:rPr lang="ru-RU" smtClean="0"/>
-              <a:t>03.01.2016</a:t>
+              <a:t>04.01.2016</a:t>
             </a:fld>
             <a:endParaRPr lang="ru-RU" dirty="0"/>
           </a:p>
@@ -2788,7 +2787,7 @@
           <a:p>
             <a:fld id="{FF11F0EC-4F60-4544-9956-271209A740FE}" type="datetimeFigureOut">
               <a:rPr lang="ru-RU" smtClean="0"/>
-              <a:t>03.01.2016</a:t>
+              <a:t>04.01.2016</a:t>
             </a:fld>
             <a:endParaRPr lang="ru-RU" dirty="0"/>
           </a:p>
@@ -3039,7 +3038,7 @@
           <a:p>
             <a:fld id="{FF11F0EC-4F60-4544-9956-271209A740FE}" type="datetimeFigureOut">
               <a:rPr lang="ru-RU" smtClean="0"/>
-              <a:t>03.01.2016</a:t>
+              <a:t>04.01.2016</a:t>
             </a:fld>
             <a:endParaRPr lang="ru-RU" dirty="0"/>
           </a:p>
@@ -3617,7 +3616,7 @@
           <a:p>
             <a:fld id="{FF11F0EC-4F60-4544-9956-271209A740FE}" type="datetimeFigureOut">
               <a:rPr lang="ru-RU" smtClean="0"/>
-              <a:t>03.01.2016</a:t>
+              <a:t>04.01.2016</a:t>
             </a:fld>
             <a:endParaRPr lang="ru-RU" dirty="0"/>
           </a:p>
@@ -3847,7 +3846,7 @@
           <a:p>
             <a:fld id="{FF11F0EC-4F60-4544-9956-271209A740FE}" type="datetimeFigureOut">
               <a:rPr lang="ru-RU" smtClean="0"/>
-              <a:t>03.01.2016</a:t>
+              <a:t>04.01.2016</a:t>
             </a:fld>
             <a:endParaRPr lang="ru-RU" dirty="0"/>
           </a:p>
@@ -4027,7 +4026,7 @@
           <a:p>
             <a:fld id="{FF11F0EC-4F60-4544-9956-271209A740FE}" type="datetimeFigureOut">
               <a:rPr lang="ru-RU" smtClean="0"/>
-              <a:t>03.01.2016</a:t>
+              <a:t>04.01.2016</a:t>
             </a:fld>
             <a:endParaRPr lang="ru-RU" dirty="0"/>
           </a:p>
@@ -4203,7 +4202,7 @@
           <a:p>
             <a:fld id="{FF11F0EC-4F60-4544-9956-271209A740FE}" type="datetimeFigureOut">
               <a:rPr lang="ru-RU" smtClean="0"/>
-              <a:t>03.01.2016</a:t>
+              <a:t>04.01.2016</a:t>
             </a:fld>
             <a:endParaRPr lang="ru-RU" dirty="0"/>
           </a:p>
@@ -4450,7 +4449,7 @@
           <a:p>
             <a:fld id="{FF11F0EC-4F60-4544-9956-271209A740FE}" type="datetimeFigureOut">
               <a:rPr lang="ru-RU" smtClean="0"/>
-              <a:t>03.01.2016</a:t>
+              <a:t>04.01.2016</a:t>
             </a:fld>
             <a:endParaRPr lang="ru-RU" dirty="0"/>
           </a:p>
@@ -4682,7 +4681,7 @@
           <a:p>
             <a:fld id="{FF11F0EC-4F60-4544-9956-271209A740FE}" type="datetimeFigureOut">
               <a:rPr lang="ru-RU" smtClean="0"/>
-              <a:t>03.01.2016</a:t>
+              <a:t>04.01.2016</a:t>
             </a:fld>
             <a:endParaRPr lang="ru-RU" dirty="0"/>
           </a:p>
@@ -5056,7 +5055,7 @@
           <a:p>
             <a:fld id="{FF11F0EC-4F60-4544-9956-271209A740FE}" type="datetimeFigureOut">
               <a:rPr lang="ru-RU" smtClean="0"/>
-              <a:t>03.01.2016</a:t>
+              <a:t>04.01.2016</a:t>
             </a:fld>
             <a:endParaRPr lang="ru-RU" dirty="0"/>
           </a:p>
@@ -5179,7 +5178,7 @@
           <a:p>
             <a:fld id="{FF11F0EC-4F60-4544-9956-271209A740FE}" type="datetimeFigureOut">
               <a:rPr lang="ru-RU" smtClean="0"/>
-              <a:t>03.01.2016</a:t>
+              <a:t>04.01.2016</a:t>
             </a:fld>
             <a:endParaRPr lang="ru-RU" dirty="0"/>
           </a:p>
@@ -5274,7 +5273,7 @@
           <a:p>
             <a:fld id="{FF11F0EC-4F60-4544-9956-271209A740FE}" type="datetimeFigureOut">
               <a:rPr lang="ru-RU" smtClean="0"/>
-              <a:t>03.01.2016</a:t>
+              <a:t>04.01.2016</a:t>
             </a:fld>
             <a:endParaRPr lang="ru-RU" dirty="0"/>
           </a:p>
@@ -5529,7 +5528,7 @@
           <a:p>
             <a:fld id="{FF11F0EC-4F60-4544-9956-271209A740FE}" type="datetimeFigureOut">
               <a:rPr lang="ru-RU" smtClean="0"/>
-              <a:t>03.01.2016</a:t>
+              <a:t>04.01.2016</a:t>
             </a:fld>
             <a:endParaRPr lang="ru-RU" dirty="0"/>
           </a:p>
@@ -5792,7 +5791,7 @@
           <a:p>
             <a:fld id="{FF11F0EC-4F60-4544-9956-271209A740FE}" type="datetimeFigureOut">
               <a:rPr lang="ru-RU" smtClean="0"/>
-              <a:t>03.01.2016</a:t>
+              <a:t>04.01.2016</a:t>
             </a:fld>
             <a:endParaRPr lang="ru-RU" dirty="0"/>
           </a:p>
@@ -6876,7 +6875,7 @@
           <a:p>
             <a:fld id="{FF11F0EC-4F60-4544-9956-271209A740FE}" type="datetimeFigureOut">
               <a:rPr lang="ru-RU" smtClean="0"/>
-              <a:t>03.01.2016</a:t>
+              <a:t>04.01.2016</a:t>
             </a:fld>
             <a:endParaRPr lang="ru-RU" dirty="0"/>
           </a:p>
@@ -7551,6 +7550,13 @@
   <p:clrMapOvr>
     <a:masterClrMapping/>
   </p:clrMapOvr>
+  <p:timing>
+    <p:tnLst>
+      <p:par>
+        <p:cTn id="1" dur="indefinite" restart="never" nodeType="tmRoot"/>
+      </p:par>
+    </p:tnLst>
+  </p:timing>
 </p:sld>
 </file>
 
@@ -7595,11 +7601,7 @@
           <a:p>
             <a:r>
               <a:rPr lang="en-US" sz="6000" dirty="0" smtClean="0"/>
-              <a:t>Part </a:t>
-            </a:r>
-            <a:r>
-              <a:rPr lang="en-US" sz="6000" dirty="0" smtClean="0"/>
-              <a:t>2</a:t>
+              <a:t>Part 2</a:t>
             </a:r>
             <a:endParaRPr lang="ru-RU" sz="6000" dirty="0"/>
           </a:p>
@@ -7645,6 +7647,13 @@
   <p:clrMapOvr>
     <a:masterClrMapping/>
   </p:clrMapOvr>
+  <p:timing>
+    <p:tnLst>
+      <p:par>
+        <p:cTn id="1" dur="indefinite" restart="never" nodeType="tmRoot"/>
+      </p:par>
+    </p:tnLst>
+  </p:timing>
 </p:sld>
 </file>
 
@@ -7707,7 +7716,7 @@
         <p:spPr>
           <a:xfrm>
             <a:off x="1136824" y="867837"/>
-            <a:ext cx="4150752" cy="3416320"/>
+            <a:ext cx="4150752" cy="3831818"/>
           </a:xfrm>
           <a:prstGeom prst="rect">
             <a:avLst/>
@@ -7797,8 +7806,12 @@
               <a:buChar char="•"/>
             </a:pPr>
             <a:r>
+              <a:rPr lang="en-US" dirty="0" err="1" smtClean="0"/>
+              <a:t>AppData</a:t>
+            </a:r>
+            <a:r>
               <a:rPr lang="en-US" dirty="0" smtClean="0"/>
-              <a:t>Registry</a:t>
+              <a:t> folders</a:t>
             </a:r>
             <a:endParaRPr lang="en-US" dirty="0" smtClean="0"/>
           </a:p>
@@ -7812,17 +7825,8 @@
             </a:pPr>
             <a:r>
               <a:rPr lang="en-US" dirty="0" smtClean="0"/>
-              <a:t>Upgrade </a:t>
-            </a:r>
-            <a:r>
-              <a:rPr lang="en-US" dirty="0" smtClean="0"/>
-              <a:t>p</a:t>
-            </a:r>
-            <a:r>
-              <a:rPr lang="en-US" dirty="0" smtClean="0"/>
-              <a:t>ossibility</a:t>
-            </a:r>
-            <a:endParaRPr lang="en-US" dirty="0"/>
+              <a:t>Registry</a:t>
+            </a:r>
           </a:p>
           <a:p>
             <a:pPr marL="285750" indent="-285750">
@@ -7834,9 +7838,22 @@
             </a:pPr>
             <a:r>
               <a:rPr lang="en-US" dirty="0" smtClean="0"/>
+              <a:t>Upgrade possibility</a:t>
+            </a:r>
+            <a:endParaRPr lang="en-US" dirty="0"/>
+          </a:p>
+          <a:p>
+            <a:pPr marL="285750" indent="-285750">
+              <a:lnSpc>
+                <a:spcPct val="150000"/>
+              </a:lnSpc>
+              <a:buFont typeface="Arial" panose="020B0604020202020204" pitchFamily="34" charset="0"/>
+              <a:buChar char="•"/>
+            </a:pPr>
+            <a:r>
+              <a:rPr lang="en-US" dirty="0" smtClean="0"/>
               <a:t>Opening Readme.txt file at the end</a:t>
             </a:r>
-            <a:endParaRPr lang="en-US" dirty="0" smtClean="0"/>
           </a:p>
         </p:txBody>
       </p:sp>
@@ -7850,158 +7867,13 @@
   <p:clrMapOvr>
     <a:masterClrMapping/>
   </p:clrMapOvr>
-</p:sld>
-</file>
-
-<file path=ppt/slides/slide4.xml><?xml version="1.0" encoding="utf-8"?>
-<p:sld xmlns:a="http://schemas.openxmlformats.org/drawingml/2006/main" xmlns:r="http://schemas.openxmlformats.org/officeDocument/2006/relationships" xmlns:p="http://schemas.openxmlformats.org/presentationml/2006/main">
-  <p:cSld>
-    <p:spTree>
-      <p:nvGrpSpPr>
-        <p:cNvPr id="1" name=""/>
-        <p:cNvGrpSpPr/>
-        <p:nvPr/>
-      </p:nvGrpSpPr>
-      <p:grpSpPr>
-        <a:xfrm>
-          <a:off x="0" y="0"/>
-          <a:ext cx="0" cy="0"/>
-          <a:chOff x="0" y="0"/>
-          <a:chExt cx="0" cy="0"/>
-        </a:xfrm>
-      </p:grpSpPr>
-      <p:sp>
-        <p:nvSpPr>
-          <p:cNvPr id="6" name="Прямоугольник 5"/>
-          <p:cNvSpPr/>
-          <p:nvPr/>
-        </p:nvSpPr>
-        <p:spPr>
-          <a:xfrm>
-            <a:off x="713449" y="344617"/>
-            <a:ext cx="3257623" cy="523220"/>
-          </a:xfrm>
-          <a:prstGeom prst="rect">
-            <a:avLst/>
-          </a:prstGeom>
-        </p:spPr>
-        <p:txBody>
-          <a:bodyPr wrap="none">
-            <a:spAutoFit/>
-          </a:bodyPr>
-          <a:lstStyle/>
-          <a:p>
-            <a:r>
-              <a:rPr lang="en-US" sz="2800" dirty="0" smtClean="0"/>
-              <a:t>Built-in UI wizards:</a:t>
-            </a:r>
-            <a:endParaRPr lang="ru-RU" sz="2800" dirty="0"/>
-          </a:p>
-        </p:txBody>
-      </p:sp>
-      <p:sp>
-        <p:nvSpPr>
-          <p:cNvPr id="7" name="TextBox 6"/>
-          <p:cNvSpPr txBox="1"/>
-          <p:nvPr/>
-        </p:nvSpPr>
-        <p:spPr>
-          <a:xfrm>
-            <a:off x="1136824" y="867837"/>
-            <a:ext cx="2440412" cy="2118978"/>
-          </a:xfrm>
-          <a:prstGeom prst="rect">
-            <a:avLst/>
-          </a:prstGeom>
-          <a:noFill/>
-        </p:spPr>
-        <p:txBody>
-          <a:bodyPr wrap="none" rtlCol="0">
-            <a:spAutoFit/>
-          </a:bodyPr>
-          <a:lstStyle/>
-          <a:p>
-            <a:pPr marL="285750" indent="-285750">
-              <a:lnSpc>
-                <a:spcPct val="150000"/>
-              </a:lnSpc>
-              <a:buFont typeface="Arial" panose="020B0604020202020204" pitchFamily="34" charset="0"/>
-              <a:buChar char="•"/>
-            </a:pPr>
-            <a:r>
-              <a:rPr lang="en-US" dirty="0" err="1"/>
-              <a:t>WixUI_Advanced</a:t>
-            </a:r>
-            <a:endParaRPr lang="en-US" dirty="0"/>
-          </a:p>
-          <a:p>
-            <a:pPr marL="285750" indent="-285750">
-              <a:lnSpc>
-                <a:spcPct val="150000"/>
-              </a:lnSpc>
-              <a:buFont typeface="Arial" panose="020B0604020202020204" pitchFamily="34" charset="0"/>
-              <a:buChar char="•"/>
-            </a:pPr>
-            <a:r>
-              <a:rPr lang="en-US" dirty="0" err="1"/>
-              <a:t>WixUI_FeatureTree</a:t>
-            </a:r>
-            <a:endParaRPr lang="en-US" dirty="0"/>
-          </a:p>
-          <a:p>
-            <a:pPr marL="285750" indent="-285750">
-              <a:lnSpc>
-                <a:spcPct val="150000"/>
-              </a:lnSpc>
-              <a:buFont typeface="Arial" panose="020B0604020202020204" pitchFamily="34" charset="0"/>
-              <a:buChar char="•"/>
-            </a:pPr>
-            <a:r>
-              <a:rPr lang="en-US" dirty="0" err="1"/>
-              <a:t>WixUI_InstallDir</a:t>
-            </a:r>
-            <a:endParaRPr lang="en-US" dirty="0"/>
-          </a:p>
-          <a:p>
-            <a:pPr marL="285750" indent="-285750">
-              <a:lnSpc>
-                <a:spcPct val="150000"/>
-              </a:lnSpc>
-              <a:buFont typeface="Arial" panose="020B0604020202020204" pitchFamily="34" charset="0"/>
-              <a:buChar char="•"/>
-            </a:pPr>
-            <a:r>
-              <a:rPr lang="en-US" dirty="0" err="1"/>
-              <a:t>WixUI_Minimal</a:t>
-            </a:r>
-            <a:endParaRPr lang="en-US" dirty="0"/>
-          </a:p>
-          <a:p>
-            <a:pPr marL="285750" indent="-285750">
-              <a:lnSpc>
-                <a:spcPct val="150000"/>
-              </a:lnSpc>
-              <a:buFont typeface="Arial" panose="020B0604020202020204" pitchFamily="34" charset="0"/>
-              <a:buChar char="•"/>
-            </a:pPr>
-            <a:r>
-              <a:rPr lang="en-US" dirty="0" err="1"/>
-              <a:t>WixUI_Mondo</a:t>
-            </a:r>
-            <a:endParaRPr lang="en-US" dirty="0"/>
-          </a:p>
-        </p:txBody>
-      </p:sp>
-    </p:spTree>
-    <p:extLst>
-      <p:ext uri="{BB962C8B-B14F-4D97-AF65-F5344CB8AC3E}">
-        <p14:creationId xmlns:p14="http://schemas.microsoft.com/office/powerpoint/2010/main" val="2213262725"/>
-      </p:ext>
-    </p:extLst>
-  </p:cSld>
-  <p:clrMapOvr>
-    <a:masterClrMapping/>
-  </p:clrMapOvr>
+  <p:timing>
+    <p:tnLst>
+      <p:par>
+        <p:cTn id="1" dur="indefinite" restart="never" nodeType="tmRoot"/>
+      </p:par>
+    </p:tnLst>
+  </p:timing>
 </p:sld>
 </file>
 

</xml_diff>

<commit_message>
Added slide about shortcuts.
</commit_message>
<xml_diff>
--- a/Part 2/WiX Part 2.pptx
+++ b/Part 2/WiX Part 2.pptx
@@ -5,15 +5,16 @@
     <p:sldMasterId id="2147483660" r:id="rId2"/>
   </p:sldMasterIdLst>
   <p:notesMasterIdLst>
-    <p:notesMasterId r:id="rId6"/>
+    <p:notesMasterId r:id="rId7"/>
   </p:notesMasterIdLst>
   <p:handoutMasterIdLst>
-    <p:handoutMasterId r:id="rId7"/>
+    <p:handoutMasterId r:id="rId8"/>
   </p:handoutMasterIdLst>
   <p:sldIdLst>
     <p:sldId id="256" r:id="rId3"/>
     <p:sldId id="261" r:id="rId4"/>
     <p:sldId id="268" r:id="rId5"/>
+    <p:sldId id="269" r:id="rId6"/>
   </p:sldIdLst>
   <p:sldSz cx="12192000" cy="6858000"/>
   <p:notesSz cx="6858000" cy="9144000"/>
@@ -205,7 +206,7 @@
           <a:p>
             <a:fld id="{BE6FE14A-16AB-4C40-A7D8-3F677DBFF089}" type="datetimeFigureOut">
               <a:rPr lang="ru-RU" smtClean="0"/>
-              <a:t>04.01.2016</a:t>
+              <a:t>06.01.2016</a:t>
             </a:fld>
             <a:endParaRPr lang="ru-RU" dirty="0"/>
           </a:p>
@@ -370,7 +371,7 @@
           <a:p>
             <a:fld id="{C15A5BB7-EDD2-4B8D-93DB-AF0055258AEF}" type="datetimeFigureOut">
               <a:rPr lang="ru-RU" smtClean="0"/>
-              <a:t>04.01.2016</a:t>
+              <a:t>06.01.2016</a:t>
             </a:fld>
             <a:endParaRPr lang="ru-RU" dirty="0"/>
           </a:p>
@@ -1707,7 +1708,7 @@
           <a:p>
             <a:fld id="{FF11F0EC-4F60-4544-9956-271209A740FE}" type="datetimeFigureOut">
               <a:rPr lang="ru-RU" smtClean="0"/>
-              <a:t>04.01.2016</a:t>
+              <a:t>06.01.2016</a:t>
             </a:fld>
             <a:endParaRPr lang="ru-RU" dirty="0"/>
           </a:p>
@@ -1958,7 +1959,7 @@
           <a:p>
             <a:fld id="{FF11F0EC-4F60-4544-9956-271209A740FE}" type="datetimeFigureOut">
               <a:rPr lang="ru-RU" smtClean="0"/>
-              <a:t>04.01.2016</a:t>
+              <a:t>06.01.2016</a:t>
             </a:fld>
             <a:endParaRPr lang="ru-RU" dirty="0"/>
           </a:p>
@@ -2209,7 +2210,7 @@
           <a:p>
             <a:fld id="{FF11F0EC-4F60-4544-9956-271209A740FE}" type="datetimeFigureOut">
               <a:rPr lang="ru-RU" smtClean="0"/>
-              <a:t>04.01.2016</a:t>
+              <a:t>06.01.2016</a:t>
             </a:fld>
             <a:endParaRPr lang="ru-RU" dirty="0"/>
           </a:p>
@@ -2787,7 +2788,7 @@
           <a:p>
             <a:fld id="{FF11F0EC-4F60-4544-9956-271209A740FE}" type="datetimeFigureOut">
               <a:rPr lang="ru-RU" smtClean="0"/>
-              <a:t>04.01.2016</a:t>
+              <a:t>06.01.2016</a:t>
             </a:fld>
             <a:endParaRPr lang="ru-RU" dirty="0"/>
           </a:p>
@@ -3038,7 +3039,7 @@
           <a:p>
             <a:fld id="{FF11F0EC-4F60-4544-9956-271209A740FE}" type="datetimeFigureOut">
               <a:rPr lang="ru-RU" smtClean="0"/>
-              <a:t>04.01.2016</a:t>
+              <a:t>06.01.2016</a:t>
             </a:fld>
             <a:endParaRPr lang="ru-RU" dirty="0"/>
           </a:p>
@@ -3616,7 +3617,7 @@
           <a:p>
             <a:fld id="{FF11F0EC-4F60-4544-9956-271209A740FE}" type="datetimeFigureOut">
               <a:rPr lang="ru-RU" smtClean="0"/>
-              <a:t>04.01.2016</a:t>
+              <a:t>06.01.2016</a:t>
             </a:fld>
             <a:endParaRPr lang="ru-RU" dirty="0"/>
           </a:p>
@@ -3846,7 +3847,7 @@
           <a:p>
             <a:fld id="{FF11F0EC-4F60-4544-9956-271209A740FE}" type="datetimeFigureOut">
               <a:rPr lang="ru-RU" smtClean="0"/>
-              <a:t>04.01.2016</a:t>
+              <a:t>06.01.2016</a:t>
             </a:fld>
             <a:endParaRPr lang="ru-RU" dirty="0"/>
           </a:p>
@@ -4026,7 +4027,7 @@
           <a:p>
             <a:fld id="{FF11F0EC-4F60-4544-9956-271209A740FE}" type="datetimeFigureOut">
               <a:rPr lang="ru-RU" smtClean="0"/>
-              <a:t>04.01.2016</a:t>
+              <a:t>06.01.2016</a:t>
             </a:fld>
             <a:endParaRPr lang="ru-RU" dirty="0"/>
           </a:p>
@@ -4202,7 +4203,7 @@
           <a:p>
             <a:fld id="{FF11F0EC-4F60-4544-9956-271209A740FE}" type="datetimeFigureOut">
               <a:rPr lang="ru-RU" smtClean="0"/>
-              <a:t>04.01.2016</a:t>
+              <a:t>06.01.2016</a:t>
             </a:fld>
             <a:endParaRPr lang="ru-RU" dirty="0"/>
           </a:p>
@@ -4449,7 +4450,7 @@
           <a:p>
             <a:fld id="{FF11F0EC-4F60-4544-9956-271209A740FE}" type="datetimeFigureOut">
               <a:rPr lang="ru-RU" smtClean="0"/>
-              <a:t>04.01.2016</a:t>
+              <a:t>06.01.2016</a:t>
             </a:fld>
             <a:endParaRPr lang="ru-RU" dirty="0"/>
           </a:p>
@@ -4681,7 +4682,7 @@
           <a:p>
             <a:fld id="{FF11F0EC-4F60-4544-9956-271209A740FE}" type="datetimeFigureOut">
               <a:rPr lang="ru-RU" smtClean="0"/>
-              <a:t>04.01.2016</a:t>
+              <a:t>06.01.2016</a:t>
             </a:fld>
             <a:endParaRPr lang="ru-RU" dirty="0"/>
           </a:p>
@@ -5055,7 +5056,7 @@
           <a:p>
             <a:fld id="{FF11F0EC-4F60-4544-9956-271209A740FE}" type="datetimeFigureOut">
               <a:rPr lang="ru-RU" smtClean="0"/>
-              <a:t>04.01.2016</a:t>
+              <a:t>06.01.2016</a:t>
             </a:fld>
             <a:endParaRPr lang="ru-RU" dirty="0"/>
           </a:p>
@@ -5178,7 +5179,7 @@
           <a:p>
             <a:fld id="{FF11F0EC-4F60-4544-9956-271209A740FE}" type="datetimeFigureOut">
               <a:rPr lang="ru-RU" smtClean="0"/>
-              <a:t>04.01.2016</a:t>
+              <a:t>06.01.2016</a:t>
             </a:fld>
             <a:endParaRPr lang="ru-RU" dirty="0"/>
           </a:p>
@@ -5273,7 +5274,7 @@
           <a:p>
             <a:fld id="{FF11F0EC-4F60-4544-9956-271209A740FE}" type="datetimeFigureOut">
               <a:rPr lang="ru-RU" smtClean="0"/>
-              <a:t>04.01.2016</a:t>
+              <a:t>06.01.2016</a:t>
             </a:fld>
             <a:endParaRPr lang="ru-RU" dirty="0"/>
           </a:p>
@@ -5528,7 +5529,7 @@
           <a:p>
             <a:fld id="{FF11F0EC-4F60-4544-9956-271209A740FE}" type="datetimeFigureOut">
               <a:rPr lang="ru-RU" smtClean="0"/>
-              <a:t>04.01.2016</a:t>
+              <a:t>06.01.2016</a:t>
             </a:fld>
             <a:endParaRPr lang="ru-RU" dirty="0"/>
           </a:p>
@@ -5791,7 +5792,7 @@
           <a:p>
             <a:fld id="{FF11F0EC-4F60-4544-9956-271209A740FE}" type="datetimeFigureOut">
               <a:rPr lang="ru-RU" smtClean="0"/>
-              <a:t>04.01.2016</a:t>
+              <a:t>06.01.2016</a:t>
             </a:fld>
             <a:endParaRPr lang="ru-RU" dirty="0"/>
           </a:p>
@@ -6875,7 +6876,7 @@
           <a:p>
             <a:fld id="{FF11F0EC-4F60-4544-9956-271209A740FE}" type="datetimeFigureOut">
               <a:rPr lang="ru-RU" smtClean="0"/>
-              <a:t>04.01.2016</a:t>
+              <a:t>06.01.2016</a:t>
             </a:fld>
             <a:endParaRPr lang="ru-RU" dirty="0"/>
           </a:p>
@@ -7813,7 +7814,6 @@
               <a:rPr lang="en-US" dirty="0" smtClean="0"/>
               <a:t> folders</a:t>
             </a:r>
-            <a:endParaRPr lang="en-US" dirty="0" smtClean="0"/>
           </a:p>
           <a:p>
             <a:pPr marL="285750" indent="-285750">
@@ -7861,6 +7861,288 @@
     <p:extLst>
       <p:ext uri="{BB962C8B-B14F-4D97-AF65-F5344CB8AC3E}">
         <p14:creationId xmlns:p14="http://schemas.microsoft.com/office/powerpoint/2010/main" val="2689822490"/>
+      </p:ext>
+    </p:extLst>
+  </p:cSld>
+  <p:clrMapOvr>
+    <a:masterClrMapping/>
+  </p:clrMapOvr>
+  <p:timing>
+    <p:tnLst>
+      <p:par>
+        <p:cTn id="1" dur="indefinite" restart="never" nodeType="tmRoot"/>
+      </p:par>
+    </p:tnLst>
+  </p:timing>
+</p:sld>
+</file>
+
+<file path=ppt/slides/slide4.xml><?xml version="1.0" encoding="utf-8"?>
+<p:sld xmlns:a="http://schemas.openxmlformats.org/drawingml/2006/main" xmlns:r="http://schemas.openxmlformats.org/officeDocument/2006/relationships" xmlns:p="http://schemas.openxmlformats.org/presentationml/2006/main">
+  <p:cSld>
+    <p:spTree>
+      <p:nvGrpSpPr>
+        <p:cNvPr id="1" name=""/>
+        <p:cNvGrpSpPr/>
+        <p:nvPr/>
+      </p:nvGrpSpPr>
+      <p:grpSpPr>
+        <a:xfrm>
+          <a:off x="0" y="0"/>
+          <a:ext cx="0" cy="0"/>
+          <a:chOff x="0" y="0"/>
+          <a:chExt cx="0" cy="0"/>
+        </a:xfrm>
+      </p:grpSpPr>
+      <p:sp>
+        <p:nvSpPr>
+          <p:cNvPr id="6" name="Прямоугольник 5"/>
+          <p:cNvSpPr/>
+          <p:nvPr/>
+        </p:nvSpPr>
+        <p:spPr>
+          <a:xfrm>
+            <a:off x="713449" y="344617"/>
+            <a:ext cx="3790846" cy="523220"/>
+          </a:xfrm>
+          <a:prstGeom prst="rect">
+            <a:avLst/>
+          </a:prstGeom>
+        </p:spPr>
+        <p:txBody>
+          <a:bodyPr wrap="none">
+            <a:spAutoFit/>
+          </a:bodyPr>
+          <a:lstStyle/>
+          <a:p>
+            <a:r>
+              <a:rPr lang="en-US" sz="2800" dirty="0" smtClean="0"/>
+              <a:t>A Start Menu shortcut:</a:t>
+            </a:r>
+            <a:endParaRPr lang="ru-RU" sz="2800" dirty="0"/>
+          </a:p>
+        </p:txBody>
+      </p:sp>
+      <p:sp>
+        <p:nvSpPr>
+          <p:cNvPr id="7" name="TextBox 6"/>
+          <p:cNvSpPr txBox="1"/>
+          <p:nvPr/>
+        </p:nvSpPr>
+        <p:spPr>
+          <a:xfrm>
+            <a:off x="1136824" y="867837"/>
+            <a:ext cx="7742825" cy="4247317"/>
+          </a:xfrm>
+          <a:prstGeom prst="rect">
+            <a:avLst/>
+          </a:prstGeom>
+          <a:noFill/>
+        </p:spPr>
+        <p:txBody>
+          <a:bodyPr wrap="none" rtlCol="0">
+            <a:spAutoFit/>
+          </a:bodyPr>
+          <a:lstStyle/>
+          <a:p>
+            <a:pPr marL="285750" indent="-285750">
+              <a:lnSpc>
+                <a:spcPct val="150000"/>
+              </a:lnSpc>
+              <a:buFont typeface="Arial" panose="020B0604020202020204" pitchFamily="34" charset="0"/>
+              <a:buChar char="•"/>
+            </a:pPr>
+            <a:r>
+              <a:rPr lang="en-US" dirty="0" smtClean="0"/>
+              <a:t>Under </a:t>
+            </a:r>
+            <a:r>
+              <a:rPr lang="en-US" dirty="0" err="1" smtClean="0">
+                <a:solidFill>
+                  <a:srgbClr val="FF0000"/>
+                </a:solidFill>
+              </a:rPr>
+              <a:t>ProgramMenuFolder</a:t>
+            </a:r>
+            <a:r>
+              <a:rPr lang="en-US" dirty="0" smtClean="0"/>
+              <a:t> in the directories structure.</a:t>
+            </a:r>
+          </a:p>
+          <a:p>
+            <a:pPr marL="285750" indent="-285750">
+              <a:lnSpc>
+                <a:spcPct val="150000"/>
+              </a:lnSpc>
+              <a:buFont typeface="Arial" panose="020B0604020202020204" pitchFamily="34" charset="0"/>
+              <a:buChar char="•"/>
+            </a:pPr>
+            <a:r>
+              <a:rPr lang="en-US" dirty="0" smtClean="0"/>
+              <a:t>A separate components that contains:</a:t>
+            </a:r>
+          </a:p>
+          <a:p>
+            <a:pPr marL="742950" lvl="1" indent="-285750">
+              <a:lnSpc>
+                <a:spcPct val="150000"/>
+              </a:lnSpc>
+              <a:buFont typeface="Arial" panose="020B0604020202020204" pitchFamily="34" charset="0"/>
+              <a:buChar char="•"/>
+            </a:pPr>
+            <a:r>
+              <a:rPr lang="en-US" dirty="0" smtClean="0">
+                <a:solidFill>
+                  <a:srgbClr val="FF0000"/>
+                </a:solidFill>
+              </a:rPr>
+              <a:t>Shortcut</a:t>
+            </a:r>
+            <a:r>
+              <a:rPr lang="en-US" dirty="0" smtClean="0"/>
+              <a:t> element that describes shortcut itself:</a:t>
+            </a:r>
+          </a:p>
+          <a:p>
+            <a:pPr marL="1200150" lvl="2" indent="-285750">
+              <a:lnSpc>
+                <a:spcPct val="150000"/>
+              </a:lnSpc>
+              <a:buFont typeface="Arial" panose="020B0604020202020204" pitchFamily="34" charset="0"/>
+              <a:buChar char="•"/>
+            </a:pPr>
+            <a:r>
+              <a:rPr lang="en-US" dirty="0" smtClean="0"/>
+              <a:t>Target EXE file of the application </a:t>
+            </a:r>
+            <a:r>
+              <a:rPr lang="en-US" dirty="0"/>
+              <a:t>as </a:t>
+            </a:r>
+            <a:r>
+              <a:rPr lang="en-US" dirty="0">
+                <a:solidFill>
+                  <a:srgbClr val="FF0000"/>
+                </a:solidFill>
+              </a:rPr>
+              <a:t>Target="[#MyApp.exe</a:t>
+            </a:r>
+            <a:r>
+              <a:rPr lang="en-US" dirty="0" smtClean="0">
+                <a:solidFill>
+                  <a:srgbClr val="FF0000"/>
+                </a:solidFill>
+              </a:rPr>
+              <a:t>]"</a:t>
+            </a:r>
+            <a:r>
+              <a:rPr lang="en-US" dirty="0" smtClean="0"/>
+              <a:t>,</a:t>
+            </a:r>
+            <a:br>
+              <a:rPr lang="en-US" dirty="0" smtClean="0"/>
+            </a:br>
+            <a:r>
+              <a:rPr lang="en-US" dirty="0" smtClean="0"/>
+              <a:t>where </a:t>
+            </a:r>
+            <a:r>
+              <a:rPr lang="en-US" dirty="0" smtClean="0">
+                <a:solidFill>
+                  <a:srgbClr val="FF0000"/>
+                </a:solidFill>
+              </a:rPr>
+              <a:t>MyApp.exe</a:t>
+            </a:r>
+            <a:r>
+              <a:rPr lang="en-US" dirty="0" smtClean="0"/>
+              <a:t> – EXE file component ID.</a:t>
+            </a:r>
+          </a:p>
+          <a:p>
+            <a:pPr marL="742950" lvl="1" indent="-285750">
+              <a:lnSpc>
+                <a:spcPct val="150000"/>
+              </a:lnSpc>
+              <a:buFont typeface="Arial" panose="020B0604020202020204" pitchFamily="34" charset="0"/>
+              <a:buChar char="•"/>
+            </a:pPr>
+            <a:r>
+              <a:rPr lang="en-US" dirty="0" err="1" smtClean="0">
+                <a:solidFill>
+                  <a:srgbClr val="FF0000"/>
+                </a:solidFill>
+              </a:rPr>
+              <a:t>RemoveFolder</a:t>
+            </a:r>
+            <a:r>
+              <a:rPr lang="en-US" dirty="0" smtClean="0"/>
+              <a:t> element to delete folder from Start Menu</a:t>
+            </a:r>
+            <a:br>
+              <a:rPr lang="en-US" dirty="0" smtClean="0"/>
+            </a:br>
+            <a:r>
+              <a:rPr lang="en-US" dirty="0" smtClean="0"/>
+              <a:t>if it is created for the application,</a:t>
+            </a:r>
+          </a:p>
+          <a:p>
+            <a:pPr marL="742950" lvl="1" indent="-285750">
+              <a:lnSpc>
+                <a:spcPct val="150000"/>
+              </a:lnSpc>
+              <a:buFont typeface="Arial" panose="020B0604020202020204" pitchFamily="34" charset="0"/>
+              <a:buChar char="•"/>
+            </a:pPr>
+            <a:r>
+              <a:rPr lang="en-US" dirty="0" err="1" smtClean="0">
+                <a:solidFill>
+                  <a:srgbClr val="FF0000"/>
+                </a:solidFill>
+              </a:rPr>
+              <a:t>RegistryValue</a:t>
+            </a:r>
+            <a:r>
+              <a:rPr lang="en-US" dirty="0" smtClean="0"/>
+              <a:t> element for shortcut </a:t>
+            </a:r>
+            <a:r>
+              <a:rPr lang="en-US" dirty="0" err="1" smtClean="0"/>
+              <a:t>KeyPath</a:t>
+            </a:r>
+            <a:r>
+              <a:rPr lang="en-US" dirty="0" smtClean="0"/>
+              <a:t>.</a:t>
+            </a:r>
+            <a:endParaRPr lang="en-US" dirty="0"/>
+          </a:p>
+          <a:p>
+            <a:pPr marL="285750" indent="-285750">
+              <a:lnSpc>
+                <a:spcPct val="150000"/>
+              </a:lnSpc>
+              <a:buFont typeface="Arial" panose="020B0604020202020204" pitchFamily="34" charset="0"/>
+              <a:buChar char="•"/>
+            </a:pPr>
+            <a:r>
+              <a:rPr lang="en-US" dirty="0" smtClean="0"/>
+              <a:t>Shortcut component should be a part of the same feature that installs</a:t>
+            </a:r>
+            <a:br>
+              <a:rPr lang="en-US" dirty="0" smtClean="0"/>
+            </a:br>
+            <a:r>
+              <a:rPr lang="en-US" dirty="0" smtClean="0"/>
+              <a:t>application files.</a:t>
+            </a:r>
+          </a:p>
+        </p:txBody>
+      </p:sp>
+    </p:spTree>
+    <p:extLst>
+      <p:ext uri="{BB962C8B-B14F-4D97-AF65-F5344CB8AC3E}">
+        <p14:creationId xmlns:p14="http://schemas.microsoft.com/office/powerpoint/2010/main" val="4280660789"/>
       </p:ext>
     </p:extLst>
   </p:cSld>

</xml_diff>